<commit_message>
Update pitch and demo slide + add extension to image .PNG
</commit_message>
<xml_diff>
--- a/documents/Presentation.pptx
+++ b/documents/Presentation.pptx
@@ -7,10 +7,11 @@
   </p:sldMasterIdLst>
   <p:sldIdLst>
     <p:sldId id="256" r:id="rId3"/>
-    <p:sldId id="257" r:id="rId4"/>
-    <p:sldId id="258" r:id="rId5"/>
-    <p:sldId id="8667" r:id="rId6"/>
-    <p:sldId id="8666" r:id="rId7"/>
+    <p:sldId id="8668" r:id="rId4"/>
+    <p:sldId id="257" r:id="rId5"/>
+    <p:sldId id="258" r:id="rId6"/>
+    <p:sldId id="8667" r:id="rId7"/>
+    <p:sldId id="8666" r:id="rId8"/>
   </p:sldIdLst>
   <p:sldSz cx="12192000" cy="6858000"/>
   <p:notesSz cx="6858000" cy="9144000"/>
@@ -109,6 +110,11 @@
       </a:defRPr>
     </a:lvl9pPr>
   </p:defaultTextStyle>
+  <p:extLst>
+    <p:ext uri="{EFAFB233-063F-42B5-8137-9DF3F51BA10A}">
+      <p15:sldGuideLst xmlns:p15="http://schemas.microsoft.com/office/powerpoint/2012/main"/>
+    </p:ext>
+  </p:extLst>
 </p:presentation>
 </file>
 
@@ -10161,6 +10167,14 @@
 <file path=ppt/slides/slide1.xml><?xml version="1.0" encoding="utf-8"?>
 <p:sld xmlns:a="http://schemas.openxmlformats.org/drawingml/2006/main" xmlns:r="http://schemas.openxmlformats.org/officeDocument/2006/relationships" xmlns:p="http://schemas.openxmlformats.org/presentationml/2006/main">
   <p:cSld>
+    <p:bg>
+      <p:bgPr>
+        <a:solidFill>
+          <a:schemeClr val="bg1"/>
+        </a:solidFill>
+        <a:effectLst/>
+      </p:bgPr>
+    </p:bg>
     <p:spTree>
       <p:nvGrpSpPr>
         <p:cNvPr id="1" name=""/>
@@ -10177,6 +10191,1391 @@
       </p:grpSpPr>
       <p:sp>
         <p:nvSpPr>
+          <p:cNvPr id="71" name="Rectangle 70">
+            <a:extLst>
+              <a:ext uri="{FF2B5EF4-FFF2-40B4-BE49-F238E27FC236}">
+                <a16:creationId xmlns:a16="http://schemas.microsoft.com/office/drawing/2014/main" id="{1C4FDBE2-32F7-4AC4-A40C-C51C65B1D474}"/>
+              </a:ext>
+              <a:ext uri="{C183D7F6-B498-43B3-948B-1728B52AA6E4}">
+                <adec:decorative xmlns:adec="http://schemas.microsoft.com/office/drawing/2017/decorative" val="1"/>
+              </a:ext>
+            </a:extLst>
+          </p:cNvPr>
+          <p:cNvSpPr>
+            <a:spLocks noGrp="1" noRot="1" noChangeAspect="1" noMove="1" noResize="1" noEditPoints="1" noAdjustHandles="1" noChangeArrowheads="1" noChangeShapeType="1" noTextEdit="1"/>
+          </p:cNvSpPr>
+          <p:nvPr>
+            <p:extLst>
+              <p:ext uri="{386F3935-93C4-4BCD-93E2-E3B085C9AB24}">
+                <p16:designElem xmlns:p16="http://schemas.microsoft.com/office/powerpoint/2015/main" val="1"/>
+              </p:ext>
+            </p:extLst>
+          </p:nvPr>
+        </p:nvSpPr>
+        <p:spPr>
+          <a:xfrm>
+            <a:off x="-1" y="0"/>
+            <a:ext cx="12192000" cy="6858000"/>
+          </a:xfrm>
+          <a:prstGeom prst="rect">
+            <a:avLst/>
+          </a:prstGeom>
+          <a:solidFill>
+            <a:schemeClr val="accent2"/>
+          </a:solidFill>
+          <a:ln>
+            <a:noFill/>
+          </a:ln>
+        </p:spPr>
+        <p:style>
+          <a:lnRef idx="2">
+            <a:schemeClr val="accent1">
+              <a:shade val="50000"/>
+            </a:schemeClr>
+          </a:lnRef>
+          <a:fillRef idx="1">
+            <a:schemeClr val="accent1"/>
+          </a:fillRef>
+          <a:effectRef idx="0">
+            <a:schemeClr val="accent1"/>
+          </a:effectRef>
+          <a:fontRef idx="minor">
+            <a:schemeClr val="lt1"/>
+          </a:fontRef>
+        </p:style>
+        <p:txBody>
+          <a:bodyPr rtlCol="0" anchor="ctr"/>
+          <a:lstStyle/>
+          <a:p>
+            <a:pPr algn="r"/>
+            <a:endParaRPr lang="en-US" dirty="0">
+              <a:solidFill>
+                <a:schemeClr val="tx1"/>
+              </a:solidFill>
+            </a:endParaRPr>
+          </a:p>
+        </p:txBody>
+      </p:sp>
+      <p:sp>
+        <p:nvSpPr>
+          <p:cNvPr id="73" name="Freeform: Shape 72">
+            <a:extLst>
+              <a:ext uri="{FF2B5EF4-FFF2-40B4-BE49-F238E27FC236}">
+                <a16:creationId xmlns:a16="http://schemas.microsoft.com/office/drawing/2014/main" id="{EBF4792E-DF83-4D24-9924-01EC30A32C89}"/>
+              </a:ext>
+              <a:ext uri="{C183D7F6-B498-43B3-948B-1728B52AA6E4}">
+                <adec:decorative xmlns:adec="http://schemas.microsoft.com/office/drawing/2017/decorative" val="1"/>
+              </a:ext>
+            </a:extLst>
+          </p:cNvPr>
+          <p:cNvSpPr>
+            <a:spLocks noGrp="1" noRot="1" noChangeAspect="1" noMove="1" noResize="1" noEditPoints="1" noAdjustHandles="1" noChangeArrowheads="1" noChangeShapeType="1" noTextEdit="1"/>
+          </p:cNvSpPr>
+          <p:nvPr>
+            <p:extLst>
+              <p:ext uri="{386F3935-93C4-4BCD-93E2-E3B085C9AB24}">
+                <p16:designElem xmlns:p16="http://schemas.microsoft.com/office/powerpoint/2015/main" val="1"/>
+              </p:ext>
+            </p:extLst>
+          </p:nvPr>
+        </p:nvSpPr>
+        <p:spPr>
+          <a:xfrm>
+            <a:off x="0" y="358512"/>
+            <a:ext cx="3952259" cy="5932172"/>
+          </a:xfrm>
+          <a:custGeom>
+            <a:avLst/>
+            <a:gdLst>
+              <a:gd name="connsiteX0" fmla="*/ 986173 w 3952259"/>
+              <a:gd name="connsiteY0" fmla="*/ 0 h 5932172"/>
+              <a:gd name="connsiteX1" fmla="*/ 3952259 w 3952259"/>
+              <a:gd name="connsiteY1" fmla="*/ 2966086 h 5932172"/>
+              <a:gd name="connsiteX2" fmla="*/ 986173 w 3952259"/>
+              <a:gd name="connsiteY2" fmla="*/ 5932172 h 5932172"/>
+              <a:gd name="connsiteX3" fmla="*/ 104150 w 3952259"/>
+              <a:gd name="connsiteY3" fmla="*/ 5798823 h 5932172"/>
+              <a:gd name="connsiteX4" fmla="*/ 0 w 3952259"/>
+              <a:gd name="connsiteY4" fmla="*/ 5760704 h 5932172"/>
+              <a:gd name="connsiteX5" fmla="*/ 0 w 3952259"/>
+              <a:gd name="connsiteY5" fmla="*/ 171469 h 5932172"/>
+              <a:gd name="connsiteX6" fmla="*/ 104150 w 3952259"/>
+              <a:gd name="connsiteY6" fmla="*/ 133350 h 5932172"/>
+              <a:gd name="connsiteX7" fmla="*/ 986173 w 3952259"/>
+              <a:gd name="connsiteY7" fmla="*/ 0 h 5932172"/>
+            </a:gdLst>
+            <a:ahLst/>
+            <a:cxnLst>
+              <a:cxn ang="0">
+                <a:pos x="connsiteX0" y="connsiteY0"/>
+              </a:cxn>
+              <a:cxn ang="0">
+                <a:pos x="connsiteX1" y="connsiteY1"/>
+              </a:cxn>
+              <a:cxn ang="0">
+                <a:pos x="connsiteX2" y="connsiteY2"/>
+              </a:cxn>
+              <a:cxn ang="0">
+                <a:pos x="connsiteX3" y="connsiteY3"/>
+              </a:cxn>
+              <a:cxn ang="0">
+                <a:pos x="connsiteX4" y="connsiteY4"/>
+              </a:cxn>
+              <a:cxn ang="0">
+                <a:pos x="connsiteX5" y="connsiteY5"/>
+              </a:cxn>
+              <a:cxn ang="0">
+                <a:pos x="connsiteX6" y="connsiteY6"/>
+              </a:cxn>
+              <a:cxn ang="0">
+                <a:pos x="connsiteX7" y="connsiteY7"/>
+              </a:cxn>
+            </a:cxnLst>
+            <a:rect l="l" t="t" r="r" b="b"/>
+            <a:pathLst>
+              <a:path w="3952259" h="5932172">
+                <a:moveTo>
+                  <a:pt x="986173" y="0"/>
+                </a:moveTo>
+                <a:cubicBezTo>
+                  <a:pt x="2624297" y="0"/>
+                  <a:pt x="3952259" y="1327962"/>
+                  <a:pt x="3952259" y="2966086"/>
+                </a:cubicBezTo>
+                <a:cubicBezTo>
+                  <a:pt x="3952259" y="4604210"/>
+                  <a:pt x="2624297" y="5932172"/>
+                  <a:pt x="986173" y="5932172"/>
+                </a:cubicBezTo>
+                <a:cubicBezTo>
+                  <a:pt x="679025" y="5932172"/>
+                  <a:pt x="382781" y="5885486"/>
+                  <a:pt x="104150" y="5798823"/>
+                </a:cubicBezTo>
+                <a:lnTo>
+                  <a:pt x="0" y="5760704"/>
+                </a:lnTo>
+                <a:lnTo>
+                  <a:pt x="0" y="171469"/>
+                </a:lnTo>
+                <a:lnTo>
+                  <a:pt x="104150" y="133350"/>
+                </a:lnTo>
+                <a:cubicBezTo>
+                  <a:pt x="382781" y="46686"/>
+                  <a:pt x="679025" y="0"/>
+                  <a:pt x="986173" y="0"/>
+                </a:cubicBezTo>
+                <a:close/>
+              </a:path>
+            </a:pathLst>
+          </a:custGeom>
+          <a:solidFill>
+            <a:schemeClr val="bg1"/>
+          </a:solidFill>
+          <a:ln>
+            <a:noFill/>
+          </a:ln>
+        </p:spPr>
+        <p:style>
+          <a:lnRef idx="2">
+            <a:schemeClr val="accent1">
+              <a:shade val="50000"/>
+            </a:schemeClr>
+          </a:lnRef>
+          <a:fillRef idx="1">
+            <a:schemeClr val="accent1"/>
+          </a:fillRef>
+          <a:effectRef idx="0">
+            <a:schemeClr val="accent1"/>
+          </a:effectRef>
+          <a:fontRef idx="minor">
+            <a:schemeClr val="lt1"/>
+          </a:fontRef>
+        </p:style>
+        <p:txBody>
+          <a:bodyPr wrap="square" rtlCol="0" anchor="ctr">
+            <a:noAutofit/>
+          </a:bodyPr>
+          <a:lstStyle/>
+          <a:p>
+            <a:pPr algn="ctr"/>
+            <a:endParaRPr lang="en-US"/>
+          </a:p>
+        </p:txBody>
+      </p:sp>
+      <p:sp>
+        <p:nvSpPr>
+          <p:cNvPr id="75" name="Freeform: Shape 74">
+            <a:extLst>
+              <a:ext uri="{FF2B5EF4-FFF2-40B4-BE49-F238E27FC236}">
+                <a16:creationId xmlns:a16="http://schemas.microsoft.com/office/drawing/2014/main" id="{15837328-A57C-47AA-B520-C83F4A6BD1E4}"/>
+              </a:ext>
+              <a:ext uri="{C183D7F6-B498-43B3-948B-1728B52AA6E4}">
+                <adec:decorative xmlns:adec="http://schemas.microsoft.com/office/drawing/2017/decorative" val="1"/>
+              </a:ext>
+            </a:extLst>
+          </p:cNvPr>
+          <p:cNvSpPr>
+            <a:spLocks noGrp="1" noRot="1" noChangeAspect="1" noMove="1" noResize="1" noEditPoints="1" noAdjustHandles="1" noChangeArrowheads="1" noChangeShapeType="1" noTextEdit="1"/>
+          </p:cNvSpPr>
+          <p:nvPr>
+            <p:extLst>
+              <p:ext uri="{386F3935-93C4-4BCD-93E2-E3B085C9AB24}">
+                <p16:designElem xmlns:p16="http://schemas.microsoft.com/office/powerpoint/2015/main" val="1"/>
+              </p:ext>
+            </p:extLst>
+          </p:nvPr>
+        </p:nvSpPr>
+        <p:spPr>
+          <a:xfrm>
+            <a:off x="3858125" y="0"/>
+            <a:ext cx="4475748" cy="3256337"/>
+          </a:xfrm>
+          <a:custGeom>
+            <a:avLst/>
+            <a:gdLst>
+              <a:gd name="connsiteX0" fmla="*/ 246861 w 4475748"/>
+              <a:gd name="connsiteY0" fmla="*/ 0 h 3256337"/>
+              <a:gd name="connsiteX1" fmla="*/ 4228888 w 4475748"/>
+              <a:gd name="connsiteY1" fmla="*/ 0 h 3256337"/>
+              <a:gd name="connsiteX2" fmla="*/ 4299885 w 4475748"/>
+              <a:gd name="connsiteY2" fmla="*/ 147382 h 3256337"/>
+              <a:gd name="connsiteX3" fmla="*/ 4475748 w 4475748"/>
+              <a:gd name="connsiteY3" fmla="*/ 1018463 h 3256337"/>
+              <a:gd name="connsiteX4" fmla="*/ 2237874 w 4475748"/>
+              <a:gd name="connsiteY4" fmla="*/ 3256337 h 3256337"/>
+              <a:gd name="connsiteX5" fmla="*/ 0 w 4475748"/>
+              <a:gd name="connsiteY5" fmla="*/ 1018463 h 3256337"/>
+              <a:gd name="connsiteX6" fmla="*/ 175863 w 4475748"/>
+              <a:gd name="connsiteY6" fmla="*/ 147382 h 3256337"/>
+            </a:gdLst>
+            <a:ahLst/>
+            <a:cxnLst>
+              <a:cxn ang="0">
+                <a:pos x="connsiteX0" y="connsiteY0"/>
+              </a:cxn>
+              <a:cxn ang="0">
+                <a:pos x="connsiteX1" y="connsiteY1"/>
+              </a:cxn>
+              <a:cxn ang="0">
+                <a:pos x="connsiteX2" y="connsiteY2"/>
+              </a:cxn>
+              <a:cxn ang="0">
+                <a:pos x="connsiteX3" y="connsiteY3"/>
+              </a:cxn>
+              <a:cxn ang="0">
+                <a:pos x="connsiteX4" y="connsiteY4"/>
+              </a:cxn>
+              <a:cxn ang="0">
+                <a:pos x="connsiteX5" y="connsiteY5"/>
+              </a:cxn>
+              <a:cxn ang="0">
+                <a:pos x="connsiteX6" y="connsiteY6"/>
+              </a:cxn>
+            </a:cxnLst>
+            <a:rect l="l" t="t" r="r" b="b"/>
+            <a:pathLst>
+              <a:path w="4475748" h="3256337">
+                <a:moveTo>
+                  <a:pt x="246861" y="0"/>
+                </a:moveTo>
+                <a:lnTo>
+                  <a:pt x="4228888" y="0"/>
+                </a:lnTo>
+                <a:lnTo>
+                  <a:pt x="4299885" y="147382"/>
+                </a:lnTo>
+                <a:cubicBezTo>
+                  <a:pt x="4413128" y="415117"/>
+                  <a:pt x="4475748" y="709477"/>
+                  <a:pt x="4475748" y="1018463"/>
+                </a:cubicBezTo>
+                <a:cubicBezTo>
+                  <a:pt x="4475748" y="2254407"/>
+                  <a:pt x="3473818" y="3256337"/>
+                  <a:pt x="2237874" y="3256337"/>
+                </a:cubicBezTo>
+                <a:cubicBezTo>
+                  <a:pt x="1001930" y="3256337"/>
+                  <a:pt x="0" y="2254407"/>
+                  <a:pt x="0" y="1018463"/>
+                </a:cubicBezTo>
+                <a:cubicBezTo>
+                  <a:pt x="0" y="709477"/>
+                  <a:pt x="62621" y="415117"/>
+                  <a:pt x="175863" y="147382"/>
+                </a:cubicBezTo>
+                <a:close/>
+              </a:path>
+            </a:pathLst>
+          </a:custGeom>
+          <a:solidFill>
+            <a:schemeClr val="bg1"/>
+          </a:solidFill>
+          <a:ln>
+            <a:noFill/>
+          </a:ln>
+        </p:spPr>
+        <p:style>
+          <a:lnRef idx="2">
+            <a:schemeClr val="accent1">
+              <a:shade val="50000"/>
+            </a:schemeClr>
+          </a:lnRef>
+          <a:fillRef idx="1">
+            <a:schemeClr val="accent1"/>
+          </a:fillRef>
+          <a:effectRef idx="0">
+            <a:schemeClr val="accent1"/>
+          </a:effectRef>
+          <a:fontRef idx="minor">
+            <a:schemeClr val="lt1"/>
+          </a:fontRef>
+        </p:style>
+        <p:txBody>
+          <a:bodyPr wrap="square" rtlCol="0" anchor="ctr">
+            <a:noAutofit/>
+          </a:bodyPr>
+          <a:lstStyle/>
+          <a:p>
+            <a:pPr algn="ctr"/>
+            <a:endParaRPr lang="en-US"/>
+          </a:p>
+        </p:txBody>
+      </p:sp>
+      <p:sp>
+        <p:nvSpPr>
+          <p:cNvPr id="77" name="Arc 76">
+            <a:extLst>
+              <a:ext uri="{FF2B5EF4-FFF2-40B4-BE49-F238E27FC236}">
+                <a16:creationId xmlns:a16="http://schemas.microsoft.com/office/drawing/2014/main" id="{E2B33195-5BCA-4BB7-A82D-6739522687DD}"/>
+              </a:ext>
+              <a:ext uri="{C183D7F6-B498-43B3-948B-1728B52AA6E4}">
+                <adec:decorative xmlns:adec="http://schemas.microsoft.com/office/drawing/2017/decorative" val="1"/>
+              </a:ext>
+            </a:extLst>
+          </p:cNvPr>
+          <p:cNvSpPr>
+            <a:spLocks noGrp="1" noRot="1" noChangeAspect="1" noMove="1" noResize="1" noEditPoints="1" noAdjustHandles="1" noChangeArrowheads="1" noChangeShapeType="1" noTextEdit="1"/>
+          </p:cNvSpPr>
+          <p:nvPr>
+            <p:extLst>
+              <p:ext uri="{386F3935-93C4-4BCD-93E2-E3B085C9AB24}">
+                <p16:designElem xmlns:p16="http://schemas.microsoft.com/office/powerpoint/2015/main" val="1"/>
+              </p:ext>
+            </p:extLst>
+          </p:nvPr>
+        </p:nvSpPr>
+        <p:spPr>
+          <a:xfrm rot="7580241">
+            <a:off x="-1784401" y="613620"/>
+            <a:ext cx="6199926" cy="6199926"/>
+          </a:xfrm>
+          <a:prstGeom prst="arc">
+            <a:avLst>
+              <a:gd name="adj1" fmla="val 14455503"/>
+              <a:gd name="adj2" fmla="val 18389131"/>
+            </a:avLst>
+          </a:prstGeom>
+          <a:ln w="127000" cap="rnd">
+            <a:solidFill>
+              <a:schemeClr val="accent4"/>
+            </a:solidFill>
+            <a:prstDash val="dash"/>
+            <a:miter lim="800000"/>
+          </a:ln>
+        </p:spPr>
+        <p:style>
+          <a:lnRef idx="1">
+            <a:schemeClr val="accent1"/>
+          </a:lnRef>
+          <a:fillRef idx="0">
+            <a:schemeClr val="accent1"/>
+          </a:fillRef>
+          <a:effectRef idx="0">
+            <a:schemeClr val="accent1"/>
+          </a:effectRef>
+          <a:fontRef idx="minor">
+            <a:schemeClr val="tx1"/>
+          </a:fontRef>
+        </p:style>
+        <p:txBody>
+          <a:bodyPr rtlCol="0" anchor="ctr"/>
+          <a:lstStyle/>
+          <a:p>
+            <a:pPr marL="0" marR="0" lvl="0" indent="0" algn="ctr" defTabSz="914400" rtl="0" eaLnBrk="1" fontAlgn="auto" latinLnBrk="0" hangingPunct="1">
+              <a:lnSpc>
+                <a:spcPct val="100000"/>
+              </a:lnSpc>
+              <a:spcBef>
+                <a:spcPts val="0"/>
+              </a:spcBef>
+              <a:spcAft>
+                <a:spcPts val="0"/>
+              </a:spcAft>
+              <a:buClrTx/>
+              <a:buSzTx/>
+              <a:buFontTx/>
+              <a:buNone/>
+              <a:tabLst/>
+              <a:defRPr/>
+            </a:pPr>
+            <a:endParaRPr kumimoji="0" lang="en-US" sz="1800" b="0" i="0" u="none" strike="noStrike" kern="1200" cap="none" spc="0" normalizeH="0" baseline="0" noProof="0">
+              <a:ln>
+                <a:noFill/>
+              </a:ln>
+              <a:solidFill>
+                <a:srgbClr val="000000"/>
+              </a:solidFill>
+              <a:effectLst/>
+              <a:uLnTx/>
+              <a:uFillTx/>
+              <a:latin typeface="Calibri" panose="020F0502020204030204"/>
+              <a:ea typeface="+mn-ea"/>
+              <a:cs typeface="+mn-cs"/>
+            </a:endParaRPr>
+          </a:p>
+        </p:txBody>
+      </p:sp>
+      <p:pic>
+        <p:nvPicPr>
+          <p:cNvPr id="1026" name="Picture 2" descr="Dark Kitchens: A Lowdown On The New Phenomenon In Food Delivery - NDTV Food">
+            <a:extLst>
+              <a:ext uri="{FF2B5EF4-FFF2-40B4-BE49-F238E27FC236}">
+                <a16:creationId xmlns:a16="http://schemas.microsoft.com/office/drawing/2014/main" id="{9D23B047-76E8-4A23-80AE-649FFD78F029}"/>
+              </a:ext>
+            </a:extLst>
+          </p:cNvPr>
+          <p:cNvPicPr>
+            <a:picLocks noChangeAspect="1" noChangeArrowheads="1"/>
+          </p:cNvPicPr>
+          <p:nvPr/>
+        </p:nvPicPr>
+        <p:blipFill>
+          <a:blip r:embed="rId2">
+            <a:extLst>
+              <a:ext uri="{28A0092B-C50C-407E-A947-70E740481C1C}">
+                <a14:useLocalDpi xmlns:a14="http://schemas.microsoft.com/office/drawing/2010/main" val="0"/>
+              </a:ext>
+            </a:extLst>
+          </a:blip>
+          <a:stretch>
+            <a:fillRect/>
+          </a:stretch>
+        </p:blipFill>
+        <p:spPr bwMode="auto">
+          <a:xfrm>
+            <a:off x="121165" y="2473798"/>
+            <a:ext cx="3146891" cy="1778677"/>
+          </a:xfrm>
+          <a:prstGeom prst="rect">
+            <a:avLst/>
+          </a:prstGeom>
+          <a:ln>
+            <a:noFill/>
+          </a:ln>
+          <a:effectLst>
+            <a:softEdge rad="112500"/>
+          </a:effectLst>
+          <a:extLst>
+            <a:ext uri="{909E8E84-426E-40DD-AFC4-6F175D3DCCD1}">
+              <a14:hiddenFill xmlns:a14="http://schemas.microsoft.com/office/drawing/2010/main">
+                <a:solidFill>
+                  <a:srgbClr val="FFFFFF"/>
+                </a:solidFill>
+              </a14:hiddenFill>
+            </a:ext>
+          </a:extLst>
+        </p:spPr>
+      </p:pic>
+      <p:pic>
+        <p:nvPicPr>
+          <p:cNvPr id="3" name="Graphic 2" descr="Stopwatch">
+            <a:extLst>
+              <a:ext uri="{FF2B5EF4-FFF2-40B4-BE49-F238E27FC236}">
+                <a16:creationId xmlns:a16="http://schemas.microsoft.com/office/drawing/2014/main" id="{04238052-6971-4AB9-BB20-545EBC1120EB}"/>
+              </a:ext>
+            </a:extLst>
+          </p:cNvPr>
+          <p:cNvPicPr>
+            <a:picLocks noChangeAspect="1"/>
+          </p:cNvPicPr>
+          <p:nvPr/>
+        </p:nvPicPr>
+        <p:blipFill>
+          <a:blip r:embed="rId3">
+            <a:extLst>
+              <a:ext uri="{28A0092B-C50C-407E-A947-70E740481C1C}">
+                <a14:useLocalDpi xmlns:a14="http://schemas.microsoft.com/office/drawing/2010/main" val="0"/>
+              </a:ext>
+              <a:ext uri="{96DAC541-7B7A-43D3-8B79-37D633B846F1}">
+                <asvg:svgBlip xmlns:asvg="http://schemas.microsoft.com/office/drawing/2016/SVG/main" r:embed="rId4"/>
+              </a:ext>
+            </a:extLst>
+          </a:blip>
+          <a:stretch>
+            <a:fillRect/>
+          </a:stretch>
+        </p:blipFill>
+        <p:spPr>
+          <a:xfrm>
+            <a:off x="4851980" y="133707"/>
+            <a:ext cx="2488039" cy="2488039"/>
+          </a:xfrm>
+          <a:custGeom>
+            <a:avLst/>
+            <a:gdLst/>
+            <a:ahLst/>
+            <a:cxnLst/>
+            <a:rect l="l" t="t" r="r" b="b"/>
+            <a:pathLst>
+              <a:path w="2487175" h="2487175">
+                <a:moveTo>
+                  <a:pt x="67328" y="0"/>
+                </a:moveTo>
+                <a:lnTo>
+                  <a:pt x="2419847" y="0"/>
+                </a:lnTo>
+                <a:cubicBezTo>
+                  <a:pt x="2457031" y="0"/>
+                  <a:pt x="2487175" y="30144"/>
+                  <a:pt x="2487175" y="67328"/>
+                </a:cubicBezTo>
+                <a:lnTo>
+                  <a:pt x="2487175" y="2419847"/>
+                </a:lnTo>
+                <a:cubicBezTo>
+                  <a:pt x="2487175" y="2457031"/>
+                  <a:pt x="2457031" y="2487175"/>
+                  <a:pt x="2419847" y="2487175"/>
+                </a:cubicBezTo>
+                <a:lnTo>
+                  <a:pt x="67328" y="2487175"/>
+                </a:lnTo>
+                <a:cubicBezTo>
+                  <a:pt x="30144" y="2487175"/>
+                  <a:pt x="0" y="2457031"/>
+                  <a:pt x="0" y="2419847"/>
+                </a:cubicBezTo>
+                <a:lnTo>
+                  <a:pt x="0" y="67328"/>
+                </a:lnTo>
+                <a:cubicBezTo>
+                  <a:pt x="0" y="30144"/>
+                  <a:pt x="30144" y="0"/>
+                  <a:pt x="67328" y="0"/>
+                </a:cubicBezTo>
+                <a:close/>
+              </a:path>
+            </a:pathLst>
+          </a:custGeom>
+        </p:spPr>
+      </p:pic>
+      <p:sp>
+        <p:nvSpPr>
+          <p:cNvPr id="79" name="Freeform: Shape 78">
+            <a:extLst>
+              <a:ext uri="{FF2B5EF4-FFF2-40B4-BE49-F238E27FC236}">
+                <a16:creationId xmlns:a16="http://schemas.microsoft.com/office/drawing/2014/main" id="{8A03A6A2-7849-4179-B68F-C11DDDB231D4}"/>
+              </a:ext>
+              <a:ext uri="{C183D7F6-B498-43B3-948B-1728B52AA6E4}">
+                <adec:decorative xmlns:adec="http://schemas.microsoft.com/office/drawing/2017/decorative" val="1"/>
+              </a:ext>
+            </a:extLst>
+          </p:cNvPr>
+          <p:cNvSpPr>
+            <a:spLocks noGrp="1" noRot="1" noChangeAspect="1" noMove="1" noResize="1" noEditPoints="1" noAdjustHandles="1" noChangeArrowheads="1" noChangeShapeType="1" noTextEdit="1"/>
+          </p:cNvSpPr>
+          <p:nvPr>
+            <p:extLst>
+              <p:ext uri="{386F3935-93C4-4BCD-93E2-E3B085C9AB24}">
+                <p16:designElem xmlns:p16="http://schemas.microsoft.com/office/powerpoint/2015/main" val="1"/>
+              </p:ext>
+            </p:extLst>
+          </p:nvPr>
+        </p:nvSpPr>
+        <p:spPr>
+          <a:xfrm>
+            <a:off x="8751078" y="0"/>
+            <a:ext cx="3440922" cy="3674631"/>
+          </a:xfrm>
+          <a:custGeom>
+            <a:avLst/>
+            <a:gdLst>
+              <a:gd name="connsiteX0" fmla="*/ 523074 w 3440922"/>
+              <a:gd name="connsiteY0" fmla="*/ 0 h 3674631"/>
+              <a:gd name="connsiteX1" fmla="*/ 3440922 w 3440922"/>
+              <a:gd name="connsiteY1" fmla="*/ 0 h 3674631"/>
+              <a:gd name="connsiteX2" fmla="*/ 3440922 w 3440922"/>
+              <a:gd name="connsiteY2" fmla="*/ 3321701 h 3674631"/>
+              <a:gd name="connsiteX3" fmla="*/ 3304578 w 3440922"/>
+              <a:gd name="connsiteY3" fmla="*/ 3404532 h 3674631"/>
+              <a:gd name="connsiteX4" fmla="*/ 2237874 w 3440922"/>
+              <a:gd name="connsiteY4" fmla="*/ 3674631 h 3674631"/>
+              <a:gd name="connsiteX5" fmla="*/ 0 w 3440922"/>
+              <a:gd name="connsiteY5" fmla="*/ 1436757 h 3674631"/>
+              <a:gd name="connsiteX6" fmla="*/ 511022 w 3440922"/>
+              <a:gd name="connsiteY6" fmla="*/ 13261 h 3674631"/>
+            </a:gdLst>
+            <a:ahLst/>
+            <a:cxnLst>
+              <a:cxn ang="0">
+                <a:pos x="connsiteX0" y="connsiteY0"/>
+              </a:cxn>
+              <a:cxn ang="0">
+                <a:pos x="connsiteX1" y="connsiteY1"/>
+              </a:cxn>
+              <a:cxn ang="0">
+                <a:pos x="connsiteX2" y="connsiteY2"/>
+              </a:cxn>
+              <a:cxn ang="0">
+                <a:pos x="connsiteX3" y="connsiteY3"/>
+              </a:cxn>
+              <a:cxn ang="0">
+                <a:pos x="connsiteX4" y="connsiteY4"/>
+              </a:cxn>
+              <a:cxn ang="0">
+                <a:pos x="connsiteX5" y="connsiteY5"/>
+              </a:cxn>
+              <a:cxn ang="0">
+                <a:pos x="connsiteX6" y="connsiteY6"/>
+              </a:cxn>
+            </a:cxnLst>
+            <a:rect l="l" t="t" r="r" b="b"/>
+            <a:pathLst>
+              <a:path w="3440922" h="3674631">
+                <a:moveTo>
+                  <a:pt x="523074" y="0"/>
+                </a:moveTo>
+                <a:lnTo>
+                  <a:pt x="3440922" y="0"/>
+                </a:lnTo>
+                <a:lnTo>
+                  <a:pt x="3440922" y="3321701"/>
+                </a:lnTo>
+                <a:lnTo>
+                  <a:pt x="3304578" y="3404532"/>
+                </a:lnTo>
+                <a:cubicBezTo>
+                  <a:pt x="2987486" y="3576786"/>
+                  <a:pt x="2624107" y="3674631"/>
+                  <a:pt x="2237874" y="3674631"/>
+                </a:cubicBezTo>
+                <a:cubicBezTo>
+                  <a:pt x="1001930" y="3674631"/>
+                  <a:pt x="0" y="2672701"/>
+                  <a:pt x="0" y="1436757"/>
+                </a:cubicBezTo>
+                <a:cubicBezTo>
+                  <a:pt x="0" y="896032"/>
+                  <a:pt x="191776" y="400098"/>
+                  <a:pt x="511022" y="13261"/>
+                </a:cubicBezTo>
+                <a:close/>
+              </a:path>
+            </a:pathLst>
+          </a:custGeom>
+          <a:solidFill>
+            <a:schemeClr val="bg1"/>
+          </a:solidFill>
+          <a:ln>
+            <a:noFill/>
+          </a:ln>
+        </p:spPr>
+        <p:style>
+          <a:lnRef idx="2">
+            <a:schemeClr val="accent1">
+              <a:shade val="50000"/>
+            </a:schemeClr>
+          </a:lnRef>
+          <a:fillRef idx="1">
+            <a:schemeClr val="accent1"/>
+          </a:fillRef>
+          <a:effectRef idx="0">
+            <a:schemeClr val="accent1"/>
+          </a:effectRef>
+          <a:fontRef idx="minor">
+            <a:schemeClr val="lt1"/>
+          </a:fontRef>
+        </p:style>
+        <p:txBody>
+          <a:bodyPr wrap="square" rtlCol="0" anchor="ctr">
+            <a:noAutofit/>
+          </a:bodyPr>
+          <a:lstStyle/>
+          <a:p>
+            <a:pPr algn="ctr"/>
+            <a:endParaRPr lang="en-US"/>
+          </a:p>
+        </p:txBody>
+      </p:sp>
+      <p:pic>
+        <p:nvPicPr>
+          <p:cNvPr id="6" name="Graphic 5" descr="Presentation with org chart">
+            <a:extLst>
+              <a:ext uri="{FF2B5EF4-FFF2-40B4-BE49-F238E27FC236}">
+                <a16:creationId xmlns:a16="http://schemas.microsoft.com/office/drawing/2014/main" id="{D466DE62-D3BA-4371-AC76-BA7AC23857A9}"/>
+              </a:ext>
+            </a:extLst>
+          </p:cNvPr>
+          <p:cNvPicPr>
+            <a:picLocks noChangeAspect="1"/>
+          </p:cNvPicPr>
+          <p:nvPr/>
+        </p:nvPicPr>
+        <p:blipFill>
+          <a:blip r:embed="rId5">
+            <a:extLst>
+              <a:ext uri="{28A0092B-C50C-407E-A947-70E740481C1C}">
+                <a14:useLocalDpi xmlns:a14="http://schemas.microsoft.com/office/drawing/2010/main" val="0"/>
+              </a:ext>
+              <a:ext uri="{96DAC541-7B7A-43D3-8B79-37D633B846F1}">
+                <asvg:svgBlip xmlns:asvg="http://schemas.microsoft.com/office/drawing/2016/SVG/main" r:embed="rId6"/>
+              </a:ext>
+            </a:extLst>
+          </a:blip>
+          <a:stretch>
+            <a:fillRect/>
+          </a:stretch>
+        </p:blipFill>
+        <p:spPr>
+          <a:xfrm>
+            <a:off x="9542995" y="407063"/>
+            <a:ext cx="2378947" cy="2378947"/>
+          </a:xfrm>
+          <a:custGeom>
+            <a:avLst/>
+            <a:gdLst/>
+            <a:ahLst/>
+            <a:cxnLst/>
+            <a:rect l="l" t="t" r="r" b="b"/>
+            <a:pathLst>
+              <a:path w="2028107" h="1916009">
+                <a:moveTo>
+                  <a:pt x="35370" y="0"/>
+                </a:moveTo>
+                <a:lnTo>
+                  <a:pt x="1992737" y="0"/>
+                </a:lnTo>
+                <a:cubicBezTo>
+                  <a:pt x="2012271" y="0"/>
+                  <a:pt x="2028107" y="15836"/>
+                  <a:pt x="2028107" y="35370"/>
+                </a:cubicBezTo>
+                <a:lnTo>
+                  <a:pt x="2028107" y="1880639"/>
+                </a:lnTo>
+                <a:cubicBezTo>
+                  <a:pt x="2028107" y="1900173"/>
+                  <a:pt x="2012271" y="1916009"/>
+                  <a:pt x="1992737" y="1916009"/>
+                </a:cubicBezTo>
+                <a:lnTo>
+                  <a:pt x="35370" y="1916009"/>
+                </a:lnTo>
+                <a:cubicBezTo>
+                  <a:pt x="15836" y="1916009"/>
+                  <a:pt x="0" y="1900173"/>
+                  <a:pt x="0" y="1880639"/>
+                </a:cubicBezTo>
+                <a:lnTo>
+                  <a:pt x="0" y="35370"/>
+                </a:lnTo>
+                <a:cubicBezTo>
+                  <a:pt x="0" y="15836"/>
+                  <a:pt x="15836" y="0"/>
+                  <a:pt x="35370" y="0"/>
+                </a:cubicBezTo>
+                <a:close/>
+              </a:path>
+            </a:pathLst>
+          </a:custGeom>
+        </p:spPr>
+      </p:pic>
+      <p:pic>
+        <p:nvPicPr>
+          <p:cNvPr id="14" name="Graphic 13" descr="Stopwatch">
+            <a:extLst>
+              <a:ext uri="{FF2B5EF4-FFF2-40B4-BE49-F238E27FC236}">
+                <a16:creationId xmlns:a16="http://schemas.microsoft.com/office/drawing/2014/main" id="{50F5330C-2F66-4393-BE17-698E18C84244}"/>
+              </a:ext>
+            </a:extLst>
+          </p:cNvPr>
+          <p:cNvPicPr>
+            <a:picLocks noChangeAspect="1"/>
+          </p:cNvPicPr>
+          <p:nvPr/>
+        </p:nvPicPr>
+        <p:blipFill>
+          <a:blip r:embed="rId3">
+            <a:extLst>
+              <a:ext uri="{28A0092B-C50C-407E-A947-70E740481C1C}">
+                <a14:useLocalDpi xmlns:a14="http://schemas.microsoft.com/office/drawing/2010/main" val="0"/>
+              </a:ext>
+              <a:ext uri="{96DAC541-7B7A-43D3-8B79-37D633B846F1}">
+                <asvg:svgBlip xmlns:asvg="http://schemas.microsoft.com/office/drawing/2016/SVG/main" r:embed="rId4"/>
+              </a:ext>
+            </a:extLst>
+          </a:blip>
+          <a:stretch>
+            <a:fillRect/>
+          </a:stretch>
+        </p:blipFill>
+        <p:spPr>
+          <a:xfrm>
+            <a:off x="6889865" y="165258"/>
+            <a:ext cx="900309" cy="900309"/>
+          </a:xfrm>
+          <a:custGeom>
+            <a:avLst/>
+            <a:gdLst/>
+            <a:ahLst/>
+            <a:cxnLst/>
+            <a:rect l="l" t="t" r="r" b="b"/>
+            <a:pathLst>
+              <a:path w="2487175" h="2487175">
+                <a:moveTo>
+                  <a:pt x="67328" y="0"/>
+                </a:moveTo>
+                <a:lnTo>
+                  <a:pt x="2419847" y="0"/>
+                </a:lnTo>
+                <a:cubicBezTo>
+                  <a:pt x="2457031" y="0"/>
+                  <a:pt x="2487175" y="30144"/>
+                  <a:pt x="2487175" y="67328"/>
+                </a:cubicBezTo>
+                <a:lnTo>
+                  <a:pt x="2487175" y="2419847"/>
+                </a:lnTo>
+                <a:cubicBezTo>
+                  <a:pt x="2487175" y="2457031"/>
+                  <a:pt x="2457031" y="2487175"/>
+                  <a:pt x="2419847" y="2487175"/>
+                </a:cubicBezTo>
+                <a:lnTo>
+                  <a:pt x="67328" y="2487175"/>
+                </a:lnTo>
+                <a:cubicBezTo>
+                  <a:pt x="30144" y="2487175"/>
+                  <a:pt x="0" y="2457031"/>
+                  <a:pt x="0" y="2419847"/>
+                </a:cubicBezTo>
+                <a:lnTo>
+                  <a:pt x="0" y="67328"/>
+                </a:lnTo>
+                <a:cubicBezTo>
+                  <a:pt x="0" y="30144"/>
+                  <a:pt x="30144" y="0"/>
+                  <a:pt x="67328" y="0"/>
+                </a:cubicBezTo>
+                <a:close/>
+              </a:path>
+            </a:pathLst>
+          </a:custGeom>
+        </p:spPr>
+      </p:pic>
+      <p:pic>
+        <p:nvPicPr>
+          <p:cNvPr id="15" name="Graphic 14" descr="Stopwatch">
+            <a:extLst>
+              <a:ext uri="{FF2B5EF4-FFF2-40B4-BE49-F238E27FC236}">
+                <a16:creationId xmlns:a16="http://schemas.microsoft.com/office/drawing/2014/main" id="{1A6E5B11-46DF-4F15-9968-867591068CCD}"/>
+              </a:ext>
+            </a:extLst>
+          </p:cNvPr>
+          <p:cNvPicPr>
+            <a:picLocks noChangeAspect="1"/>
+          </p:cNvPicPr>
+          <p:nvPr/>
+        </p:nvPicPr>
+        <p:blipFill>
+          <a:blip r:embed="rId3">
+            <a:extLst>
+              <a:ext uri="{28A0092B-C50C-407E-A947-70E740481C1C}">
+                <a14:useLocalDpi xmlns:a14="http://schemas.microsoft.com/office/drawing/2010/main" val="0"/>
+              </a:ext>
+              <a:ext uri="{96DAC541-7B7A-43D3-8B79-37D633B846F1}">
+                <asvg:svgBlip xmlns:asvg="http://schemas.microsoft.com/office/drawing/2016/SVG/main" r:embed="rId4"/>
+              </a:ext>
+            </a:extLst>
+          </a:blip>
+          <a:stretch>
+            <a:fillRect/>
+          </a:stretch>
+        </p:blipFill>
+        <p:spPr>
+          <a:xfrm>
+            <a:off x="7061388" y="1108422"/>
+            <a:ext cx="900309" cy="900309"/>
+          </a:xfrm>
+          <a:custGeom>
+            <a:avLst/>
+            <a:gdLst/>
+            <a:ahLst/>
+            <a:cxnLst/>
+            <a:rect l="l" t="t" r="r" b="b"/>
+            <a:pathLst>
+              <a:path w="2487175" h="2487175">
+                <a:moveTo>
+                  <a:pt x="67328" y="0"/>
+                </a:moveTo>
+                <a:lnTo>
+                  <a:pt x="2419847" y="0"/>
+                </a:lnTo>
+                <a:cubicBezTo>
+                  <a:pt x="2457031" y="0"/>
+                  <a:pt x="2487175" y="30144"/>
+                  <a:pt x="2487175" y="67328"/>
+                </a:cubicBezTo>
+                <a:lnTo>
+                  <a:pt x="2487175" y="2419847"/>
+                </a:lnTo>
+                <a:cubicBezTo>
+                  <a:pt x="2487175" y="2457031"/>
+                  <a:pt x="2457031" y="2487175"/>
+                  <a:pt x="2419847" y="2487175"/>
+                </a:cubicBezTo>
+                <a:lnTo>
+                  <a:pt x="67328" y="2487175"/>
+                </a:lnTo>
+                <a:cubicBezTo>
+                  <a:pt x="30144" y="2487175"/>
+                  <a:pt x="0" y="2457031"/>
+                  <a:pt x="0" y="2419847"/>
+                </a:cubicBezTo>
+                <a:lnTo>
+                  <a:pt x="0" y="67328"/>
+                </a:lnTo>
+                <a:cubicBezTo>
+                  <a:pt x="0" y="30144"/>
+                  <a:pt x="30144" y="0"/>
+                  <a:pt x="67328" y="0"/>
+                </a:cubicBezTo>
+                <a:close/>
+              </a:path>
+            </a:pathLst>
+          </a:custGeom>
+        </p:spPr>
+      </p:pic>
+      <p:pic>
+        <p:nvPicPr>
+          <p:cNvPr id="16" name="Graphic 15" descr="Stopwatch">
+            <a:extLst>
+              <a:ext uri="{FF2B5EF4-FFF2-40B4-BE49-F238E27FC236}">
+                <a16:creationId xmlns:a16="http://schemas.microsoft.com/office/drawing/2014/main" id="{6C91524A-A4EC-4EF9-83A0-9D751A6FCECA}"/>
+              </a:ext>
+            </a:extLst>
+          </p:cNvPr>
+          <p:cNvPicPr>
+            <a:picLocks noChangeAspect="1"/>
+          </p:cNvPicPr>
+          <p:nvPr/>
+        </p:nvPicPr>
+        <p:blipFill>
+          <a:blip r:embed="rId3">
+            <a:extLst>
+              <a:ext uri="{28A0092B-C50C-407E-A947-70E740481C1C}">
+                <a14:useLocalDpi xmlns:a14="http://schemas.microsoft.com/office/drawing/2010/main" val="0"/>
+              </a:ext>
+              <a:ext uri="{96DAC541-7B7A-43D3-8B79-37D633B846F1}">
+                <asvg:svgBlip xmlns:asvg="http://schemas.microsoft.com/office/drawing/2016/SVG/main" r:embed="rId4"/>
+              </a:ext>
+            </a:extLst>
+          </a:blip>
+          <a:stretch>
+            <a:fillRect/>
+          </a:stretch>
+        </p:blipFill>
+        <p:spPr>
+          <a:xfrm>
+            <a:off x="6541562" y="2038732"/>
+            <a:ext cx="900309" cy="900309"/>
+          </a:xfrm>
+          <a:custGeom>
+            <a:avLst/>
+            <a:gdLst/>
+            <a:ahLst/>
+            <a:cxnLst/>
+            <a:rect l="l" t="t" r="r" b="b"/>
+            <a:pathLst>
+              <a:path w="2487175" h="2487175">
+                <a:moveTo>
+                  <a:pt x="67328" y="0"/>
+                </a:moveTo>
+                <a:lnTo>
+                  <a:pt x="2419847" y="0"/>
+                </a:lnTo>
+                <a:cubicBezTo>
+                  <a:pt x="2457031" y="0"/>
+                  <a:pt x="2487175" y="30144"/>
+                  <a:pt x="2487175" y="67328"/>
+                </a:cubicBezTo>
+                <a:lnTo>
+                  <a:pt x="2487175" y="2419847"/>
+                </a:lnTo>
+                <a:cubicBezTo>
+                  <a:pt x="2487175" y="2457031"/>
+                  <a:pt x="2457031" y="2487175"/>
+                  <a:pt x="2419847" y="2487175"/>
+                </a:cubicBezTo>
+                <a:lnTo>
+                  <a:pt x="67328" y="2487175"/>
+                </a:lnTo>
+                <a:cubicBezTo>
+                  <a:pt x="30144" y="2487175"/>
+                  <a:pt x="0" y="2457031"/>
+                  <a:pt x="0" y="2419847"/>
+                </a:cubicBezTo>
+                <a:lnTo>
+                  <a:pt x="0" y="67328"/>
+                </a:lnTo>
+                <a:cubicBezTo>
+                  <a:pt x="0" y="30144"/>
+                  <a:pt x="30144" y="0"/>
+                  <a:pt x="67328" y="0"/>
+                </a:cubicBezTo>
+                <a:close/>
+              </a:path>
+            </a:pathLst>
+          </a:custGeom>
+        </p:spPr>
+      </p:pic>
+      <p:pic>
+        <p:nvPicPr>
+          <p:cNvPr id="17" name="Graphic 16" descr="Stopwatch">
+            <a:extLst>
+              <a:ext uri="{FF2B5EF4-FFF2-40B4-BE49-F238E27FC236}">
+                <a16:creationId xmlns:a16="http://schemas.microsoft.com/office/drawing/2014/main" id="{19DD3F3A-21B4-4CE1-B51E-1E7F9933AF7D}"/>
+              </a:ext>
+            </a:extLst>
+          </p:cNvPr>
+          <p:cNvPicPr>
+            <a:picLocks noChangeAspect="1"/>
+          </p:cNvPicPr>
+          <p:nvPr/>
+        </p:nvPicPr>
+        <p:blipFill>
+          <a:blip r:embed="rId3">
+            <a:extLst>
+              <a:ext uri="{28A0092B-C50C-407E-A947-70E740481C1C}">
+                <a14:useLocalDpi xmlns:a14="http://schemas.microsoft.com/office/drawing/2010/main" val="0"/>
+              </a:ext>
+              <a:ext uri="{96DAC541-7B7A-43D3-8B79-37D633B846F1}">
+                <asvg:svgBlip xmlns:asvg="http://schemas.microsoft.com/office/drawing/2016/SVG/main" r:embed="rId4"/>
+              </a:ext>
+            </a:extLst>
+          </a:blip>
+          <a:stretch>
+            <a:fillRect/>
+          </a:stretch>
+        </p:blipFill>
+        <p:spPr>
+          <a:xfrm>
+            <a:off x="5512895" y="2386029"/>
+            <a:ext cx="900309" cy="900309"/>
+          </a:xfrm>
+          <a:custGeom>
+            <a:avLst/>
+            <a:gdLst/>
+            <a:ahLst/>
+            <a:cxnLst/>
+            <a:rect l="l" t="t" r="r" b="b"/>
+            <a:pathLst>
+              <a:path w="2487175" h="2487175">
+                <a:moveTo>
+                  <a:pt x="67328" y="0"/>
+                </a:moveTo>
+                <a:lnTo>
+                  <a:pt x="2419847" y="0"/>
+                </a:lnTo>
+                <a:cubicBezTo>
+                  <a:pt x="2457031" y="0"/>
+                  <a:pt x="2487175" y="30144"/>
+                  <a:pt x="2487175" y="67328"/>
+                </a:cubicBezTo>
+                <a:lnTo>
+                  <a:pt x="2487175" y="2419847"/>
+                </a:lnTo>
+                <a:cubicBezTo>
+                  <a:pt x="2487175" y="2457031"/>
+                  <a:pt x="2457031" y="2487175"/>
+                  <a:pt x="2419847" y="2487175"/>
+                </a:cubicBezTo>
+                <a:lnTo>
+                  <a:pt x="67328" y="2487175"/>
+                </a:lnTo>
+                <a:cubicBezTo>
+                  <a:pt x="30144" y="2487175"/>
+                  <a:pt x="0" y="2457031"/>
+                  <a:pt x="0" y="2419847"/>
+                </a:cubicBezTo>
+                <a:lnTo>
+                  <a:pt x="0" y="67328"/>
+                </a:lnTo>
+                <a:cubicBezTo>
+                  <a:pt x="0" y="30144"/>
+                  <a:pt x="30144" y="0"/>
+                  <a:pt x="67328" y="0"/>
+                </a:cubicBezTo>
+                <a:close/>
+              </a:path>
+            </a:pathLst>
+          </a:custGeom>
+        </p:spPr>
+      </p:pic>
+      <p:pic>
+        <p:nvPicPr>
+          <p:cNvPr id="18" name="Graphic 17" descr="Stopwatch">
+            <a:extLst>
+              <a:ext uri="{FF2B5EF4-FFF2-40B4-BE49-F238E27FC236}">
+                <a16:creationId xmlns:a16="http://schemas.microsoft.com/office/drawing/2014/main" id="{858416B8-5934-4E91-B7D4-C688C54199F6}"/>
+              </a:ext>
+            </a:extLst>
+          </p:cNvPr>
+          <p:cNvPicPr>
+            <a:picLocks noChangeAspect="1"/>
+          </p:cNvPicPr>
+          <p:nvPr/>
+        </p:nvPicPr>
+        <p:blipFill>
+          <a:blip r:embed="rId3">
+            <a:extLst>
+              <a:ext uri="{28A0092B-C50C-407E-A947-70E740481C1C}">
+                <a14:useLocalDpi xmlns:a14="http://schemas.microsoft.com/office/drawing/2010/main" val="0"/>
+              </a:ext>
+              <a:ext uri="{96DAC541-7B7A-43D3-8B79-37D633B846F1}">
+                <asvg:svgBlip xmlns:asvg="http://schemas.microsoft.com/office/drawing/2016/SVG/main" r:embed="rId4"/>
+              </a:ext>
+            </a:extLst>
+          </a:blip>
+          <a:stretch>
+            <a:fillRect/>
+          </a:stretch>
+        </p:blipFill>
+        <p:spPr>
+          <a:xfrm>
+            <a:off x="4507500" y="1935875"/>
+            <a:ext cx="900309" cy="900309"/>
+          </a:xfrm>
+          <a:custGeom>
+            <a:avLst/>
+            <a:gdLst/>
+            <a:ahLst/>
+            <a:cxnLst/>
+            <a:rect l="l" t="t" r="r" b="b"/>
+            <a:pathLst>
+              <a:path w="2487175" h="2487175">
+                <a:moveTo>
+                  <a:pt x="67328" y="0"/>
+                </a:moveTo>
+                <a:lnTo>
+                  <a:pt x="2419847" y="0"/>
+                </a:lnTo>
+                <a:cubicBezTo>
+                  <a:pt x="2457031" y="0"/>
+                  <a:pt x="2487175" y="30144"/>
+                  <a:pt x="2487175" y="67328"/>
+                </a:cubicBezTo>
+                <a:lnTo>
+                  <a:pt x="2487175" y="2419847"/>
+                </a:lnTo>
+                <a:cubicBezTo>
+                  <a:pt x="2487175" y="2457031"/>
+                  <a:pt x="2457031" y="2487175"/>
+                  <a:pt x="2419847" y="2487175"/>
+                </a:cubicBezTo>
+                <a:lnTo>
+                  <a:pt x="67328" y="2487175"/>
+                </a:lnTo>
+                <a:cubicBezTo>
+                  <a:pt x="30144" y="2487175"/>
+                  <a:pt x="0" y="2457031"/>
+                  <a:pt x="0" y="2419847"/>
+                </a:cubicBezTo>
+                <a:lnTo>
+                  <a:pt x="0" y="67328"/>
+                </a:lnTo>
+                <a:cubicBezTo>
+                  <a:pt x="0" y="30144"/>
+                  <a:pt x="30144" y="0"/>
+                  <a:pt x="67328" y="0"/>
+                </a:cubicBezTo>
+                <a:close/>
+              </a:path>
+            </a:pathLst>
+          </a:custGeom>
+        </p:spPr>
+      </p:pic>
+      <p:pic>
+        <p:nvPicPr>
+          <p:cNvPr id="19" name="Graphic 18" descr="Stopwatch">
+            <a:extLst>
+              <a:ext uri="{FF2B5EF4-FFF2-40B4-BE49-F238E27FC236}">
+                <a16:creationId xmlns:a16="http://schemas.microsoft.com/office/drawing/2014/main" id="{8911B086-6614-4726-8E2A-FA1D1B6B780A}"/>
+              </a:ext>
+            </a:extLst>
+          </p:cNvPr>
+          <p:cNvPicPr>
+            <a:picLocks noChangeAspect="1"/>
+          </p:cNvPicPr>
+          <p:nvPr/>
+        </p:nvPicPr>
+        <p:blipFill>
+          <a:blip r:embed="rId3">
+            <a:extLst>
+              <a:ext uri="{28A0092B-C50C-407E-A947-70E740481C1C}">
+                <a14:useLocalDpi xmlns:a14="http://schemas.microsoft.com/office/drawing/2010/main" val="0"/>
+              </a:ext>
+              <a:ext uri="{96DAC541-7B7A-43D3-8B79-37D633B846F1}">
+                <asvg:svgBlip xmlns:asvg="http://schemas.microsoft.com/office/drawing/2016/SVG/main" r:embed="rId4"/>
+              </a:ext>
+            </a:extLst>
+          </a:blip>
+          <a:stretch>
+            <a:fillRect/>
+          </a:stretch>
+        </p:blipFill>
+        <p:spPr>
+          <a:xfrm>
+            <a:off x="4131768" y="1065567"/>
+            <a:ext cx="900309" cy="900309"/>
+          </a:xfrm>
+          <a:custGeom>
+            <a:avLst/>
+            <a:gdLst/>
+            <a:ahLst/>
+            <a:cxnLst/>
+            <a:rect l="l" t="t" r="r" b="b"/>
+            <a:pathLst>
+              <a:path w="2487175" h="2487175">
+                <a:moveTo>
+                  <a:pt x="67328" y="0"/>
+                </a:moveTo>
+                <a:lnTo>
+                  <a:pt x="2419847" y="0"/>
+                </a:lnTo>
+                <a:cubicBezTo>
+                  <a:pt x="2457031" y="0"/>
+                  <a:pt x="2487175" y="30144"/>
+                  <a:pt x="2487175" y="67328"/>
+                </a:cubicBezTo>
+                <a:lnTo>
+                  <a:pt x="2487175" y="2419847"/>
+                </a:lnTo>
+                <a:cubicBezTo>
+                  <a:pt x="2487175" y="2457031"/>
+                  <a:pt x="2457031" y="2487175"/>
+                  <a:pt x="2419847" y="2487175"/>
+                </a:cubicBezTo>
+                <a:lnTo>
+                  <a:pt x="67328" y="2487175"/>
+                </a:lnTo>
+                <a:cubicBezTo>
+                  <a:pt x="30144" y="2487175"/>
+                  <a:pt x="0" y="2457031"/>
+                  <a:pt x="0" y="2419847"/>
+                </a:cubicBezTo>
+                <a:lnTo>
+                  <a:pt x="0" y="67328"/>
+                </a:lnTo>
+                <a:cubicBezTo>
+                  <a:pt x="0" y="30144"/>
+                  <a:pt x="30144" y="0"/>
+                  <a:pt x="67328" y="0"/>
+                </a:cubicBezTo>
+                <a:close/>
+              </a:path>
+            </a:pathLst>
+          </a:custGeom>
+        </p:spPr>
+      </p:pic>
+      <p:pic>
+        <p:nvPicPr>
+          <p:cNvPr id="20" name="Graphic 19" descr="Stopwatch">
+            <a:extLst>
+              <a:ext uri="{FF2B5EF4-FFF2-40B4-BE49-F238E27FC236}">
+                <a16:creationId xmlns:a16="http://schemas.microsoft.com/office/drawing/2014/main" id="{C753A958-1E53-4947-903E-66CD026EE4FF}"/>
+              </a:ext>
+            </a:extLst>
+          </p:cNvPr>
+          <p:cNvPicPr>
+            <a:picLocks noChangeAspect="1"/>
+          </p:cNvPicPr>
+          <p:nvPr/>
+        </p:nvPicPr>
+        <p:blipFill>
+          <a:blip r:embed="rId3">
+            <a:extLst>
+              <a:ext uri="{28A0092B-C50C-407E-A947-70E740481C1C}">
+                <a14:useLocalDpi xmlns:a14="http://schemas.microsoft.com/office/drawing/2010/main" val="0"/>
+              </a:ext>
+              <a:ext uri="{96DAC541-7B7A-43D3-8B79-37D633B846F1}">
+                <asvg:svgBlip xmlns:asvg="http://schemas.microsoft.com/office/drawing/2016/SVG/main" r:embed="rId4"/>
+              </a:ext>
+            </a:extLst>
+          </a:blip>
+          <a:stretch>
+            <a:fillRect/>
+          </a:stretch>
+        </p:blipFill>
+        <p:spPr>
+          <a:xfrm>
+            <a:off x="4477698" y="182791"/>
+            <a:ext cx="900309" cy="900309"/>
+          </a:xfrm>
+          <a:custGeom>
+            <a:avLst/>
+            <a:gdLst/>
+            <a:ahLst/>
+            <a:cxnLst/>
+            <a:rect l="l" t="t" r="r" b="b"/>
+            <a:pathLst>
+              <a:path w="2487175" h="2487175">
+                <a:moveTo>
+                  <a:pt x="67328" y="0"/>
+                </a:moveTo>
+                <a:lnTo>
+                  <a:pt x="2419847" y="0"/>
+                </a:lnTo>
+                <a:cubicBezTo>
+                  <a:pt x="2457031" y="0"/>
+                  <a:pt x="2487175" y="30144"/>
+                  <a:pt x="2487175" y="67328"/>
+                </a:cubicBezTo>
+                <a:lnTo>
+                  <a:pt x="2487175" y="2419847"/>
+                </a:lnTo>
+                <a:cubicBezTo>
+                  <a:pt x="2487175" y="2457031"/>
+                  <a:pt x="2457031" y="2487175"/>
+                  <a:pt x="2419847" y="2487175"/>
+                </a:cubicBezTo>
+                <a:lnTo>
+                  <a:pt x="67328" y="2487175"/>
+                </a:lnTo>
+                <a:cubicBezTo>
+                  <a:pt x="30144" y="2487175"/>
+                  <a:pt x="0" y="2457031"/>
+                  <a:pt x="0" y="2419847"/>
+                </a:cubicBezTo>
+                <a:lnTo>
+                  <a:pt x="0" y="67328"/>
+                </a:lnTo>
+                <a:cubicBezTo>
+                  <a:pt x="0" y="30144"/>
+                  <a:pt x="30144" y="0"/>
+                  <a:pt x="67328" y="0"/>
+                </a:cubicBezTo>
+                <a:close/>
+              </a:path>
+            </a:pathLst>
+          </a:custGeom>
+        </p:spPr>
+      </p:pic>
+      <p:sp>
+        <p:nvSpPr>
           <p:cNvPr id="4" name="Title 3">
             <a:extLst>
               <a:ext uri="{FF2B5EF4-FFF2-40B4-BE49-F238E27FC236}">
@@ -10191,16 +11590,23 @@
             <p:ph type="title"/>
           </p:nvPr>
         </p:nvSpPr>
-        <p:spPr/>
-        <p:txBody>
-          <a:bodyPr/>
+        <p:spPr>
+          <a:xfrm>
+            <a:off x="6672912" y="3955520"/>
+            <a:ext cx="4059556" cy="900309"/>
+          </a:xfrm>
+        </p:spPr>
+        <p:txBody>
+          <a:bodyPr vert="horz" lIns="91440" tIns="45720" rIns="91440" bIns="45720" rtlCol="0" anchor="b">
+            <a:noAutofit/>
+          </a:bodyPr>
           <a:lstStyle/>
           <a:p>
-            <a:r>
-              <a:rPr lang="nb-NO" dirty="0"/>
-              <a:t>Pitch</a:t>
-            </a:r>
-            <a:endParaRPr lang="en-US" dirty="0"/>
+            <a:pPr algn="ctr"/>
+            <a:r>
+              <a:rPr lang="en-US" sz="6000" b="1" dirty="0"/>
+              <a:t>Timer</a:t>
+            </a:r>
           </a:p>
         </p:txBody>
       </p:sp>
@@ -10234,12 +11640,48 @@
           <a:chExt cx="0" cy="0"/>
         </a:xfrm>
       </p:grpSpPr>
+      <p:pic>
+        <p:nvPicPr>
+          <p:cNvPr id="4" name="Picture 3" descr="Diagram&#10;&#10;Description automatically generated">
+            <a:extLst>
+              <a:ext uri="{FF2B5EF4-FFF2-40B4-BE49-F238E27FC236}">
+                <a16:creationId xmlns:a16="http://schemas.microsoft.com/office/drawing/2014/main" id="{9DC7242A-AA23-495D-BD98-2DAF39A61FCC}"/>
+              </a:ext>
+            </a:extLst>
+          </p:cNvPr>
+          <p:cNvPicPr>
+            <a:picLocks noChangeAspect="1"/>
+          </p:cNvPicPr>
+          <p:nvPr/>
+        </p:nvPicPr>
+        <p:blipFill>
+          <a:blip r:embed="rId2">
+            <a:extLst>
+              <a:ext uri="{28A0092B-C50C-407E-A947-70E740481C1C}">
+                <a14:useLocalDpi xmlns:a14="http://schemas.microsoft.com/office/drawing/2010/main" val="0"/>
+              </a:ext>
+            </a:extLst>
+          </a:blip>
+          <a:stretch>
+            <a:fillRect/>
+          </a:stretch>
+        </p:blipFill>
+        <p:spPr>
+          <a:xfrm>
+            <a:off x="0" y="330827"/>
+            <a:ext cx="12192000" cy="6196346"/>
+          </a:xfrm>
+          <a:prstGeom prst="rect">
+            <a:avLst/>
+          </a:prstGeom>
+        </p:spPr>
+      </p:pic>
       <p:sp>
         <p:nvSpPr>
           <p:cNvPr id="2" name="Title 1">
             <a:extLst>
               <a:ext uri="{FF2B5EF4-FFF2-40B4-BE49-F238E27FC236}">
-                <a16:creationId xmlns:a16="http://schemas.microsoft.com/office/drawing/2014/main" id="{C8E848E8-BFBC-44D1-8459-524896656CC4}"/>
+                <a16:creationId xmlns:a16="http://schemas.microsoft.com/office/drawing/2014/main" id="{CA1E3081-3DCF-4E0A-9A06-03627E0712F9}"/>
               </a:ext>
             </a:extLst>
           </p:cNvPr>
@@ -10250,18 +11692,69 @@
             <p:ph type="title"/>
           </p:nvPr>
         </p:nvSpPr>
-        <p:spPr/>
-        <p:txBody>
-          <a:bodyPr/>
+        <p:spPr>
+          <a:xfrm>
+            <a:off x="4856375" y="0"/>
+            <a:ext cx="2479250" cy="1325563"/>
+          </a:xfrm>
+        </p:spPr>
+        <p:txBody>
+          <a:bodyPr>
+            <a:noAutofit/>
+          </a:bodyPr>
           <a:lstStyle/>
           <a:p>
             <a:r>
+              <a:rPr lang="en-US" sz="6600" b="1" dirty="0"/>
+              <a:t>DEMO</a:t>
+            </a:r>
+          </a:p>
+        </p:txBody>
+      </p:sp>
+      <p:sp>
+        <p:nvSpPr>
+          <p:cNvPr id="5" name="Rectangle: Rounded Corners 4">
+            <a:hlinkClick r:id="rId3"/>
+            <a:extLst>
+              <a:ext uri="{FF2B5EF4-FFF2-40B4-BE49-F238E27FC236}">
+                <a16:creationId xmlns:a16="http://schemas.microsoft.com/office/drawing/2014/main" id="{361FCC72-ED91-442B-9592-C4F89489A228}"/>
+              </a:ext>
+            </a:extLst>
+          </p:cNvPr>
+          <p:cNvSpPr/>
+          <p:nvPr/>
+        </p:nvSpPr>
+        <p:spPr>
+          <a:xfrm>
+            <a:off x="105266" y="6379700"/>
+            <a:ext cx="1600985" cy="294945"/>
+          </a:xfrm>
+          <a:prstGeom prst="roundRect">
+            <a:avLst/>
+          </a:prstGeom>
+        </p:spPr>
+        <p:style>
+          <a:lnRef idx="1">
+            <a:schemeClr val="accent1"/>
+          </a:lnRef>
+          <a:fillRef idx="2">
+            <a:schemeClr val="accent1"/>
+          </a:fillRef>
+          <a:effectRef idx="1">
+            <a:schemeClr val="accent1"/>
+          </a:effectRef>
+          <a:fontRef idx="minor">
+            <a:schemeClr val="dk1"/>
+          </a:fontRef>
+        </p:style>
+        <p:txBody>
+          <a:bodyPr rtlCol="0" anchor="ctr"/>
+          <a:lstStyle/>
+          <a:p>
+            <a:pPr algn="ctr"/>
+            <a:r>
               <a:rPr lang="nb-NO" dirty="0"/>
-              <a:t>Technology </a:t>
-            </a:r>
-            <a:r>
-              <a:rPr lang="nb-NO" dirty="0" err="1"/>
-              <a:t>Stack</a:t>
+              <a:t>Go to</a:t>
             </a:r>
             <a:endParaRPr lang="en-US" dirty="0"/>
           </a:p>
@@ -10270,7 +11763,7 @@
     </p:spTree>
     <p:extLst>
       <p:ext uri="{BB962C8B-B14F-4D97-AF65-F5344CB8AC3E}">
-        <p14:creationId xmlns:p14="http://schemas.microsoft.com/office/powerpoint/2010/main" val="522814403"/>
+        <p14:creationId xmlns:p14="http://schemas.microsoft.com/office/powerpoint/2010/main" val="1467995346"/>
       </p:ext>
     </p:extLst>
   </p:cSld>
@@ -10302,7 +11795,7 @@
           <p:cNvPr id="2" name="Title 1">
             <a:extLst>
               <a:ext uri="{FF2B5EF4-FFF2-40B4-BE49-F238E27FC236}">
-                <a16:creationId xmlns:a16="http://schemas.microsoft.com/office/drawing/2014/main" id="{F5ECDE44-A884-4179-AE66-ADD2D3CBE2A2}"/>
+                <a16:creationId xmlns:a16="http://schemas.microsoft.com/office/drawing/2014/main" id="{C8E848E8-BFBC-44D1-8459-524896656CC4}"/>
               </a:ext>
             </a:extLst>
           </p:cNvPr>
@@ -10319,35 +11812,68 @@
           <a:lstStyle/>
           <a:p>
             <a:r>
+              <a:rPr lang="en-US"/>
+              <a:t>Technology Stack</a:t>
+            </a:r>
+          </a:p>
+        </p:txBody>
+      </p:sp>
+    </p:spTree>
+    <p:extLst>
+      <p:ext uri="{BB962C8B-B14F-4D97-AF65-F5344CB8AC3E}">
+        <p14:creationId xmlns:p14="http://schemas.microsoft.com/office/powerpoint/2010/main" val="522814403"/>
+      </p:ext>
+    </p:extLst>
+  </p:cSld>
+  <p:clrMapOvr>
+    <a:masterClrMapping/>
+  </p:clrMapOvr>
+</p:sld>
+</file>
+
+<file path=ppt/slides/slide4.xml><?xml version="1.0" encoding="utf-8"?>
+<p:sld xmlns:a="http://schemas.openxmlformats.org/drawingml/2006/main" xmlns:r="http://schemas.openxmlformats.org/officeDocument/2006/relationships" xmlns:p="http://schemas.openxmlformats.org/presentationml/2006/main">
+  <p:cSld>
+    <p:spTree>
+      <p:nvGrpSpPr>
+        <p:cNvPr id="1" name=""/>
+        <p:cNvGrpSpPr/>
+        <p:nvPr/>
+      </p:nvGrpSpPr>
+      <p:grpSpPr>
+        <a:xfrm>
+          <a:off x="0" y="0"/>
+          <a:ext cx="0" cy="0"/>
+          <a:chOff x="0" y="0"/>
+          <a:chExt cx="0" cy="0"/>
+        </a:xfrm>
+      </p:grpSpPr>
+      <p:sp>
+        <p:nvSpPr>
+          <p:cNvPr id="2" name="Title 1">
+            <a:extLst>
+              <a:ext uri="{FF2B5EF4-FFF2-40B4-BE49-F238E27FC236}">
+                <a16:creationId xmlns:a16="http://schemas.microsoft.com/office/drawing/2014/main" id="{F5ECDE44-A884-4179-AE66-ADD2D3CBE2A2}"/>
+              </a:ext>
+            </a:extLst>
+          </p:cNvPr>
+          <p:cNvSpPr>
+            <a:spLocks noGrp="1"/>
+          </p:cNvSpPr>
+          <p:nvPr>
+            <p:ph type="title"/>
+          </p:nvPr>
+        </p:nvSpPr>
+        <p:spPr/>
+        <p:txBody>
+          <a:bodyPr/>
+          <a:lstStyle/>
+          <a:p>
+            <a:r>
               <a:rPr lang="nb-NO" dirty="0"/>
               <a:t>High Level Architecture</a:t>
             </a:r>
             <a:endParaRPr lang="en-US" dirty="0"/>
-          </a:p>
-        </p:txBody>
-      </p:sp>
-      <p:sp>
-        <p:nvSpPr>
-          <p:cNvPr id="3" name="Content Placeholder 2">
-            <a:extLst>
-              <a:ext uri="{FF2B5EF4-FFF2-40B4-BE49-F238E27FC236}">
-                <a16:creationId xmlns:a16="http://schemas.microsoft.com/office/drawing/2014/main" id="{9B567144-3AD5-488B-B5D3-C2A8A4E0D3B2}"/>
-              </a:ext>
-            </a:extLst>
-          </p:cNvPr>
-          <p:cNvSpPr>
-            <a:spLocks noGrp="1"/>
-          </p:cNvSpPr>
-          <p:nvPr>
-            <p:ph idx="1"/>
-          </p:nvPr>
-        </p:nvSpPr>
-        <p:spPr/>
-        <p:txBody>
-          <a:bodyPr/>
-          <a:lstStyle/>
-          <a:p>
-            <a:endParaRPr lang="en-US"/>
           </a:p>
         </p:txBody>
       </p:sp>
@@ -10364,7 +11890,7 @@
 </p:sld>
 </file>
 
-<file path=ppt/slides/slide4.xml><?xml version="1.0" encoding="utf-8"?>
+<file path=ppt/slides/slide5.xml><?xml version="1.0" encoding="utf-8"?>
 <p:sld xmlns:a="http://schemas.openxmlformats.org/drawingml/2006/main" xmlns:r="http://schemas.openxmlformats.org/officeDocument/2006/relationships" xmlns:p="http://schemas.openxmlformats.org/presentationml/2006/main">
   <p:cSld>
     <p:spTree>
@@ -10628,7 +12154,7 @@
 </p:sld>
 </file>
 
-<file path=ppt/slides/slide5.xml><?xml version="1.0" encoding="utf-8"?>
+<file path=ppt/slides/slide6.xml><?xml version="1.0" encoding="utf-8"?>
 <p:sld xmlns:a="http://schemas.openxmlformats.org/drawingml/2006/main" xmlns:r="http://schemas.openxmlformats.org/officeDocument/2006/relationships" xmlns:p="http://schemas.openxmlformats.org/presentationml/2006/main">
   <p:cSld>
     <p:spTree>
@@ -10891,7 +12417,7 @@
                 <a:tabLst/>
                 <a:defRPr/>
               </a:pPr>
-              <a:t>5</a:t>
+              <a:t>6</a:t>
             </a:fld>
             <a:endParaRPr kumimoji="0" lang="en-US" sz="1200" b="0" i="0" u="none" strike="noStrike" kern="1200" cap="none" spc="0" normalizeH="0" baseline="0" noProof="0" dirty="0">
               <a:ln>

</xml_diff>